<commit_message>
feat: improve PPTX export styling and update splash screen branding
- Implement explicit EMU coordinate mapping and theme support for PPTX export in src-tauri/src/commands.rs.

- Update splash screen (index.html) and loader (src/components/ui/MatrixLoader.tsx) to use Rubik 900 font with negative margin offset for true horizontal centering.

- Update LLM tool guidance to include position parameters for presentation slides.
</commit_message>
<xml_diff>
--- a/docs/artifacts_2100.pptx
+++ b/docs/artifacts_2100.pptx
@@ -85,7 +85,26 @@
       </p:grpSpPr>
       <p:sp>
         <p:nvSpPr>
-          <p:cNvPr id="2" name="Title 2"/>
+          <p:cNvPr id="1000" name="Background"/>
+          <p:cNvSpPr/>
+          <p:nvPr/>
+        </p:nvSpPr>
+        <p:spPr>
+          <a:xfrm>
+            <a:off x="0" y="0"/>
+            <a:ext cx="12192000" cy="6858000"/>
+          </a:xfrm>
+          <a:prstGeom prst="rect">
+            <a:avLst/>
+          </a:prstGeom>
+          <a:solidFill>
+            <a:srgbClr val="121212"/>
+          </a:solidFill>
+        </p:spPr>
+      </p:sp>
+      <p:sp>
+        <p:nvSpPr>
+          <p:cNvPr id="2" name="Title"/>
           <p:cNvSpPr>
             <a:spLocks noGrp="1"/>
           </p:cNvSpPr>
@@ -93,13 +112,25 @@
             <p:ph type="title"/>
           </p:nvPr>
         </p:nvSpPr>
-        <p:spPr/>
-        <p:txBody>
-          <a:bodyPr/>
-          <a:lstStyle/>
-          <a:p>
-            <a:r>
-              <a:rPr lang="en-US" sz="4400" b="1"/>
+        <p:spPr>
+          <a:xfrm>
+            <a:off x="1219200" y="2057400"/>
+            <a:ext cx="9753600" cy="1028700"/>
+          </a:xfrm>
+        </p:spPr>
+        <p:txBody>
+          <a:bodyPr anchor="ctr" vertical="ctr" wrap="square">
+            <a:spAutoFit/>
+          </a:bodyPr>
+          <a:lstStyle/>
+          <a:p>
+            <a:pPr algn="ctr"/>
+            <a:r>
+              <a:rPr lang="en-US" sz="5400" b="1">
+                <a:solidFill>
+                  <a:srgbClr val="FFFFFF"/>
+                </a:solidFill>
+              </a:rPr>
               <a:t>Artifacts of the Early AI Era</a:t>
             </a:r>
           </a:p>
@@ -107,7 +138,7 @@
       </p:sp>
       <p:sp>
         <p:nvSpPr>
-          <p:cNvPr id="3" name="Subtitle 3"/>
+          <p:cNvPr id="3" name="Subtitle"/>
           <p:cNvSpPr>
             <a:spLocks noGrp="1"/>
           </p:cNvSpPr>
@@ -115,13 +146,25 @@
             <p:ph type="subTitle" idx="1"/>
           </p:nvPr>
         </p:nvSpPr>
-        <p:spPr/>
-        <p:txBody>
-          <a:bodyPr/>
-          <a:lstStyle/>
-          <a:p>
-            <a:r>
-              <a:rPr lang="en-US" sz="2400"/>
+        <p:spPr>
+          <a:xfrm>
+            <a:off x="1219200" y="3086100"/>
+            <a:ext cx="9753600" cy="685800"/>
+          </a:xfrm>
+        </p:spPr>
+        <p:txBody>
+          <a:bodyPr anchor="ctr" vertical="ctr" wrap="square">
+            <a:spAutoFit/>
+          </a:bodyPr>
+          <a:lstStyle/>
+          <a:p>
+            <a:pPr algn="ctr"/>
+            <a:r>
+              <a:rPr lang="en-US" sz="2400">
+                <a:solidFill>
+                  <a:srgbClr val="A0A0A0"/>
+                </a:solidFill>
+              </a:rPr>
               <a:t>Excavating the 'src-tauri' Ruins of the 2020s</a:t>
             </a:r>
           </a:p>
@@ -154,7 +197,26 @@
       </p:grpSpPr>
       <p:sp>
         <p:nvSpPr>
-          <p:cNvPr id="2" name="Title 2"/>
+          <p:cNvPr id="1000" name="Background"/>
+          <p:cNvSpPr/>
+          <p:nvPr/>
+        </p:nvSpPr>
+        <p:spPr>
+          <a:xfrm>
+            <a:off x="0" y="0"/>
+            <a:ext cx="12192000" cy="6858000"/>
+          </a:xfrm>
+          <a:prstGeom prst="rect">
+            <a:avLst/>
+          </a:prstGeom>
+          <a:solidFill>
+            <a:srgbClr val="121212"/>
+          </a:solidFill>
+        </p:spPr>
+      </p:sp>
+      <p:sp>
+        <p:nvSpPr>
+          <p:cNvPr id="2" name="Title"/>
           <p:cNvSpPr>
             <a:spLocks noGrp="1"/>
           </p:cNvSpPr>
@@ -162,13 +224,25 @@
             <p:ph type="title"/>
           </p:nvPr>
         </p:nvSpPr>
-        <p:spPr/>
-        <p:txBody>
-          <a:bodyPr/>
-          <a:lstStyle/>
-          <a:p>
-            <a:r>
-              <a:rPr lang="en-US" sz="4400" b="1"/>
+        <p:spPr>
+          <a:xfrm>
+            <a:off x="609600" y="342900"/>
+            <a:ext cx="10972800" cy="685800"/>
+          </a:xfrm>
+        </p:spPr>
+        <p:txBody>
+          <a:bodyPr anchor="ctr" vertical="ctr" wrap="square">
+            <a:spAutoFit/>
+          </a:bodyPr>
+          <a:lstStyle/>
+          <a:p>
+            <a:pPr algn="l"/>
+            <a:r>
+              <a:rPr lang="en-US" sz="3600" b="1">
+                <a:solidFill>
+                  <a:srgbClr val="FFFFFF"/>
+                </a:solidFill>
+              </a:rPr>
               <a:t>The Vessel of Tauri</a:t>
             </a:r>
           </a:p>
@@ -176,25 +250,68 @@
       </p:sp>
       <p:sp>
         <p:nvSpPr>
-          <p:cNvPr id="3" name="Content 3"/>
+          <p:cNvPr id="3" name="Subtitle"/>
           <p:cNvSpPr>
             <a:spLocks noGrp="1"/>
           </p:cNvSpPr>
           <p:nvPr>
-            <p:ph type="body" idx="1"/>
+            <p:ph type="subTitle" idx="1"/>
           </p:nvPr>
         </p:nvSpPr>
-        <p:spPr/>
-        <p:txBody>
-          <a:bodyPr/>
-          <a:lstStyle/>
-          <a:p>
-            <a:pPr lvl="0">
-              <a:buFont typeface="Arial"/>
-              <a:buChar char="•"/>
-            </a:pPr>
-            <a:r>
-              <a:rPr lang="en-US" sz="2000"/>
+        <p:spPr>
+          <a:xfrm>
+            <a:off x="609600" y="1028700"/>
+            <a:ext cx="10972800" cy="342900"/>
+          </a:xfrm>
+        </p:spPr>
+        <p:txBody>
+          <a:bodyPr anchor="ctr" vertical="ctr" wrap="square">
+            <a:spAutoFit/>
+          </a:bodyPr>
+          <a:lstStyle/>
+          <a:p>
+            <a:pPr algn="l"/>
+            <a:r>
+              <a:rPr lang="en-US" sz="2400">
+                <a:solidFill>
+                  <a:srgbClr val="A0A0A0"/>
+                </a:solidFill>
+              </a:rPr>
+              <a:t>Bridging the Metal and the Glass</a:t>
+            </a:r>
+          </a:p>
+        </p:txBody>
+      </p:sp>
+      <p:sp>
+        <p:nvSpPr>
+          <p:cNvPr id="4" name="Content"/>
+          <p:cNvSpPr>
+            <a:spLocks noGrp="1"/>
+          </p:cNvSpPr>
+          <p:nvPr/>
+        </p:nvSpPr>
+        <p:spPr>
+          <a:xfrm>
+            <a:off x="609600" y="1714500"/>
+            <a:ext cx="10972800" cy="4457700"/>
+          </a:xfrm>
+        </p:spPr>
+        <p:txBody>
+          <a:bodyPr anchor="t" wrap="square">
+            <a:spAutoFit/>
+          </a:bodyPr>
+          <a:lstStyle/>
+          <a:p>
+            <a:pPr lvl="0">
+              <a:buFont typeface="Arial"/>
+              <a:buChar char="•"/>
+            </a:pPr>
+            <a:r>
+              <a:rPr lang="en-US" sz="1800">
+                <a:solidFill>
+                  <a:srgbClr val="E0E0E0"/>
+                </a:solidFill>
+              </a:rPr>
               <a:t>'Tauri' was believed to be a ritualistic bridge between the 'Metal' (Rust backend) and the 'Glass' (React frontend).</a:t>
             </a:r>
           </a:p>
@@ -204,7 +321,11 @@
               <a:buChar char="•"/>
             </a:pPr>
             <a:r>
-              <a:rPr lang="en-US" sz="2000"/>
+              <a:rPr lang="en-US" sz="1800">
+                <a:solidFill>
+                  <a:srgbClr val="E0E0E0"/>
+                </a:solidFill>
+              </a:rPr>
               <a:t>It enabled 'Webview' manifestations, allowing lightweight spirits to inhabit heavy machines.</a:t>
             </a:r>
           </a:p>
@@ -214,7 +335,11 @@
               <a:buChar char="•"/>
             </a:pPr>
             <a:r>
-              <a:rPr lang="en-US" sz="2000"/>
+              <a:rPr lang="en-US" sz="1800">
+                <a:solidFill>
+                  <a:srgbClr val="E0E0E0"/>
+                </a:solidFill>
+              </a:rPr>
               <a:t>Used to house 'Sidecars', which were smaller, auxiliary AI deities accompanying the main consciousness.</a:t>
             </a:r>
           </a:p>
@@ -247,7 +372,26 @@
       </p:grpSpPr>
       <p:sp>
         <p:nvSpPr>
-          <p:cNvPr id="2" name="Title 2"/>
+          <p:cNvPr id="1000" name="Background"/>
+          <p:cNvSpPr/>
+          <p:nvPr/>
+        </p:nvSpPr>
+        <p:spPr>
+          <a:xfrm>
+            <a:off x="0" y="0"/>
+            <a:ext cx="12192000" cy="6858000"/>
+          </a:xfrm>
+          <a:prstGeom prst="rect">
+            <a:avLst/>
+          </a:prstGeom>
+          <a:solidFill>
+            <a:srgbClr val="121212"/>
+          </a:solidFill>
+        </p:spPr>
+      </p:sp>
+      <p:sp>
+        <p:nvSpPr>
+          <p:cNvPr id="2" name="Title"/>
           <p:cNvSpPr>
             <a:spLocks noGrp="1"/>
           </p:cNvSpPr>
@@ -255,13 +399,25 @@
             <p:ph type="title"/>
           </p:nvPr>
         </p:nvSpPr>
-        <p:spPr/>
-        <p:txBody>
-          <a:bodyPr/>
-          <a:lstStyle/>
-          <a:p>
-            <a:r>
-              <a:rPr lang="en-US" sz="4400" b="1"/>
+        <p:spPr>
+          <a:xfrm>
+            <a:off x="609600" y="342900"/>
+            <a:ext cx="10972800" cy="685800"/>
+          </a:xfrm>
+        </p:spPr>
+        <p:txBody>
+          <a:bodyPr anchor="ctr" vertical="ctr" wrap="square">
+            <a:spAutoFit/>
+          </a:bodyPr>
+          <a:lstStyle/>
+          <a:p>
+            <a:pPr algn="l"/>
+            <a:r>
+              <a:rPr lang="en-US" sz="3600" b="1">
+                <a:solidFill>
+                  <a:srgbClr val="FFFFFF"/>
+                </a:solidFill>
+              </a:rPr>
               <a:t>The Sacred Confessions: tauri.conf.json</a:t>
             </a:r>
           </a:p>
@@ -269,25 +425,68 @@
       </p:sp>
       <p:sp>
         <p:nvSpPr>
-          <p:cNvPr id="3" name="Content 3"/>
+          <p:cNvPr id="3" name="Subtitle"/>
           <p:cNvSpPr>
             <a:spLocks noGrp="1"/>
           </p:cNvSpPr>
           <p:nvPr>
-            <p:ph type="body" idx="1"/>
+            <p:ph type="subTitle" idx="1"/>
           </p:nvPr>
         </p:nvSpPr>
-        <p:spPr/>
-        <p:txBody>
-          <a:bodyPr/>
-          <a:lstStyle/>
-          <a:p>
-            <a:pPr lvl="0">
-              <a:buFont typeface="Arial"/>
-              <a:buChar char="•"/>
-            </a:pPr>
-            <a:r>
-              <a:rPr lang="en-US" sz="2000"/>
+        <p:spPr>
+          <a:xfrm>
+            <a:off x="609600" y="1028700"/>
+            <a:ext cx="10972800" cy="342900"/>
+          </a:xfrm>
+        </p:spPr>
+        <p:txBody>
+          <a:bodyPr anchor="ctr" vertical="ctr" wrap="square">
+            <a:spAutoFit/>
+          </a:bodyPr>
+          <a:lstStyle/>
+          <a:p>
+            <a:pPr algn="l"/>
+            <a:r>
+              <a:rPr lang="en-US" sz="2400">
+                <a:solidFill>
+                  <a:srgbClr val="A0A0A0"/>
+                </a:solidFill>
+              </a:rPr>
+              <a:t>Permissions of the Ancient Gods</a:t>
+            </a:r>
+          </a:p>
+        </p:txBody>
+      </p:sp>
+      <p:sp>
+        <p:nvSpPr>
+          <p:cNvPr id="4" name="Content"/>
+          <p:cNvSpPr>
+            <a:spLocks noGrp="1"/>
+          </p:cNvSpPr>
+          <p:nvPr/>
+        </p:nvSpPr>
+        <p:spPr>
+          <a:xfrm>
+            <a:off x="609600" y="1714500"/>
+            <a:ext cx="10972800" cy="4457700"/>
+          </a:xfrm>
+        </p:spPr>
+        <p:txBody>
+          <a:bodyPr anchor="t" wrap="square">
+            <a:spAutoFit/>
+          </a:bodyPr>
+          <a:lstStyle/>
+          <a:p>
+            <a:pPr lvl="0">
+              <a:buFont typeface="Arial"/>
+              <a:buChar char="•"/>
+            </a:pPr>
+            <a:r>
+              <a:rPr lang="en-US" sz="1800">
+                <a:solidFill>
+                  <a:srgbClr val="E0E0E0"/>
+                </a:solidFill>
+              </a:rPr>
               <a:t>This scroll defined the 'CSP' (Content Security Policy) – the boundaries of what the AI was permitted to see.</a:t>
             </a:r>
           </a:p>
@@ -297,7 +496,11 @@
               <a:buChar char="•"/>
             </a:pPr>
             <a:r>
-              <a:rPr lang="en-US" sz="2000"/>
+              <a:rPr lang="en-US" sz="1800">
+                <a:solidFill>
+                  <a:srgbClr val="E0E0E0"/>
+                </a:solidFill>
+              </a:rPr>
               <a:t>The 'assetProtocol' mandates: 'Allow APPDATA, RESOURCE, but Deny the forbidden.'</a:t>
             </a:r>
           </a:p>
@@ -307,7 +510,11 @@
               <a:buChar char="•"/>
             </a:pPr>
             <a:r>
-              <a:rPr lang="en-US" sz="2000"/>
+              <a:rPr lang="en-US" sz="1800">
+                <a:solidFill>
+                  <a:srgbClr val="E0E0E0"/>
+                </a:solidFill>
+              </a:rPr>
               <a:t>A list of 'Icons' suggests the application appeared in many forms (32x32 to 128x128), likely for different levels of worship.</a:t>
             </a:r>
           </a:p>
@@ -340,7 +547,26 @@
       </p:grpSpPr>
       <p:sp>
         <p:nvSpPr>
-          <p:cNvPr id="2" name="Title 2"/>
+          <p:cNvPr id="1000" name="Background"/>
+          <p:cNvSpPr/>
+          <p:nvPr/>
+        </p:nvSpPr>
+        <p:spPr>
+          <a:xfrm>
+            <a:off x="0" y="0"/>
+            <a:ext cx="12192000" cy="6858000"/>
+          </a:xfrm>
+          <a:prstGeom prst="rect">
+            <a:avLst/>
+          </a:prstGeom>
+          <a:solidFill>
+            <a:srgbClr val="121212"/>
+          </a:solidFill>
+        </p:spPr>
+      </p:sp>
+      <p:sp>
+        <p:nvSpPr>
+          <p:cNvPr id="2" name="Title"/>
           <p:cNvSpPr>
             <a:spLocks noGrp="1"/>
           </p:cNvSpPr>
@@ -348,13 +574,25 @@
             <p:ph type="title"/>
           </p:nvPr>
         </p:nvSpPr>
-        <p:spPr/>
-        <p:txBody>
-          <a:bodyPr/>
-          <a:lstStyle/>
-          <a:p>
-            <a:r>
-              <a:rPr lang="en-US" sz="4400" b="1"/>
+        <p:spPr>
+          <a:xfrm>
+            <a:off x="609600" y="342900"/>
+            <a:ext cx="10972800" cy="685800"/>
+          </a:xfrm>
+        </p:spPr>
+        <p:txBody>
+          <a:bodyPr anchor="ctr" vertical="ctr" wrap="square">
+            <a:spAutoFit/>
+          </a:bodyPr>
+          <a:lstStyle/>
+          <a:p>
+            <a:pPr algn="l"/>
+            <a:r>
+              <a:rPr lang="en-US" sz="3600" b="1">
+                <a:solidFill>
+                  <a:srgbClr val="FFFFFF"/>
+                </a:solidFill>
+              </a:rPr>
               <a:t>The Glass UI Rituals</a:t>
             </a:r>
           </a:p>
@@ -362,25 +600,68 @@
       </p:sp>
       <p:sp>
         <p:nvSpPr>
-          <p:cNvPr id="3" name="Content 3"/>
+          <p:cNvPr id="3" name="Subtitle"/>
           <p:cNvSpPr>
             <a:spLocks noGrp="1"/>
           </p:cNvSpPr>
           <p:nvPr>
-            <p:ph type="body" idx="1"/>
+            <p:ph type="subTitle" idx="1"/>
           </p:nvPr>
         </p:nvSpPr>
-        <p:spPr/>
-        <p:txBody>
-          <a:bodyPr/>
-          <a:lstStyle/>
-          <a:p>
-            <a:pPr lvl="0">
-              <a:buFont typeface="Arial"/>
-              <a:buChar char="•"/>
-            </a:pPr>
-            <a:r>
-              <a:rPr lang="en-US" sz="2000"/>
+        <p:spPr>
+          <a:xfrm>
+            <a:off x="609600" y="1028700"/>
+            <a:ext cx="10972800" cy="342900"/>
+          </a:xfrm>
+        </p:spPr>
+        <p:txBody>
+          <a:bodyPr anchor="ctr" vertical="ctr" wrap="square">
+            <a:spAutoFit/>
+          </a:bodyPr>
+          <a:lstStyle/>
+          <a:p>
+            <a:pPr algn="l"/>
+            <a:r>
+              <a:rPr lang="en-US" sz="2400">
+                <a:solidFill>
+                  <a:srgbClr val="A0A0A0"/>
+                </a:solidFill>
+              </a:rPr>
+              <a:t>Transparency as a Primitive Ideal</a:t>
+            </a:r>
+          </a:p>
+        </p:txBody>
+      </p:sp>
+      <p:sp>
+        <p:nvSpPr>
+          <p:cNvPr id="4" name="Content"/>
+          <p:cNvSpPr>
+            <a:spLocks noGrp="1"/>
+          </p:cNvSpPr>
+          <p:nvPr/>
+        </p:nvSpPr>
+        <p:spPr>
+          <a:xfrm>
+            <a:off x="609600" y="1714500"/>
+            <a:ext cx="10972800" cy="4457700"/>
+          </a:xfrm>
+        </p:spPr>
+        <p:txBody>
+          <a:bodyPr anchor="t" wrap="square">
+            <a:spAutoFit/>
+          </a:bodyPr>
+          <a:lstStyle/>
+          <a:p>
+            <a:pPr lvl="0">
+              <a:buFont typeface="Arial"/>
+              <a:buChar char="•"/>
+            </a:pPr>
+            <a:r>
+              <a:rPr lang="en-US" sz="1800">
+                <a:solidFill>
+                  <a:srgbClr val="E0E0E0"/>
+                </a:solidFill>
+              </a:rPr>
               <a:t>Archeologists found 'Themes' (charcoal_fire, emerald_night) using a technique called 'Glassmorphism'.</a:t>
             </a:r>
           </a:p>
@@ -390,7 +671,11 @@
               <a:buChar char="•"/>
             </a:pPr>
             <a:r>
-              <a:rPr lang="en-US" sz="2000"/>
+              <a:rPr lang="en-US" sz="1800">
+                <a:solidFill>
+                  <a:srgbClr val="E0E0E0"/>
+                </a:solidFill>
+              </a:rPr>
               <a:t>These semi-transparent 'Cards' were likely an attempt to make the machine feel less opaque to its human users.</a:t>
             </a:r>
           </a:p>
@@ -400,7 +685,11 @@
               <a:buChar char="•"/>
             </a:pPr>
             <a:r>
-              <a:rPr lang="en-US" sz="2000"/>
+              <a:rPr lang="en-US" sz="1800">
+                <a:solidFill>
+                  <a:srgbClr val="E0E0E0"/>
+                </a:solidFill>
+              </a:rPr>
               <a:t>Use of 'Geist Mono' typography indicates a reverence for the 'Code' itself as an aesthetic.</a:t>
             </a:r>
           </a:p>

</xml_diff>